<commit_message>
Sync/Async, Block/Non-Blocking 내용 수정
</commit_message>
<xml_diff>
--- a/99.ppt/[Ch4-1. 비동기 서비스 소개] 1-2. 비동기 호출이란 ~ 1-3. Servlet_Reactive.pptx
+++ b/99.ppt/[Ch4-1. 비동기 서비스 소개] 1-2. 비동기 호출이란 ~ 1-3. Servlet_Reactive.pptx
@@ -225,7 +225,7 @@
           <a:p>
             <a:fld id="{9B770909-2C76-4DF9-BB76-4EE283593418}" type="datetimeFigureOut">
               <a:rPr lang="ko-KR" altLang="en-US" smtClean="0"/>
-              <a:t>2023-07-13</a:t>
+              <a:t>2023-07-14</a:t>
             </a:fld>
             <a:endParaRPr lang="ko-KR" altLang="en-US"/>
           </a:p>
@@ -2738,10 +2738,6 @@
           <a:lstStyle/>
           <a:p>
             <a:r>
-              <a:rPr lang="ko-KR" altLang="en-US" dirty="0"/>
-              <a:t>일반적인 </a:t>
-            </a:r>
-            <a:r>
               <a:rPr lang="en-US" altLang="ko-KR" dirty="0"/>
               <a:t>Spring MVC </a:t>
             </a:r>
@@ -2767,28 +2763,16 @@
           </a:p>
           <a:p>
             <a:r>
+              <a:rPr lang="ko-KR" altLang="en-US" dirty="0"/>
+              <a:t>일반적으로 </a:t>
+            </a:r>
+            <a:r>
               <a:rPr lang="en-US" altLang="ko-KR" dirty="0"/>
               <a:t>I/O </a:t>
             </a:r>
             <a:r>
               <a:rPr lang="ko-KR" altLang="en-US" dirty="0"/>
-              <a:t>대기시간이 대부분을 차지하는데</a:t>
-            </a:r>
-            <a:r>
-              <a:rPr lang="en-US" altLang="ko-KR" dirty="0"/>
-              <a:t>, </a:t>
-            </a:r>
-            <a:r>
-              <a:rPr lang="ko-KR" altLang="en-US" dirty="0"/>
-              <a:t>보통 </a:t>
-            </a:r>
-            <a:r>
-              <a:rPr lang="en-US" altLang="ko-KR" dirty="0"/>
-              <a:t>70~80% </a:t>
-            </a:r>
-            <a:r>
-              <a:rPr lang="ko-KR" altLang="en-US" dirty="0"/>
-              <a:t>정도 되는 것 같습니다</a:t>
+              <a:t>대기시간이 대부분을 차지하는데요</a:t>
             </a:r>
             <a:r>
               <a:rPr lang="en-US" altLang="ko-KR" dirty="0"/>
@@ -2801,12 +2785,15 @@
           <a:p>
             <a:r>
               <a:rPr lang="ko-KR" altLang="en-US" dirty="0"/>
-              <a:t>기다리는 것 밖에 하지 않는 이 대기시간이 너무 아깝다는 거죠</a:t>
+              <a:t>기다리는 것 밖에 하지 않는 이 대기시간이 너무 아까운 거죠</a:t>
             </a:r>
             <a:r>
               <a:rPr lang="en-US" altLang="ko-KR" dirty="0"/>
               <a:t>.</a:t>
             </a:r>
+          </a:p>
+          <a:p>
+            <a:endParaRPr lang="en-US" altLang="ko-KR" dirty="0"/>
           </a:p>
           <a:p>
             <a:endParaRPr lang="en-US" altLang="ko-KR" dirty="0"/>
@@ -2943,7 +2930,7 @@
           <a:p>
             <a:r>
               <a:rPr lang="ko-KR" altLang="en-US" dirty="0"/>
-              <a:t>비슷하게 들리지만 다른 개념이거든요</a:t>
+              <a:t>비슷하게 들리지만 다른 개념인데요</a:t>
             </a:r>
             <a:r>
               <a:rPr lang="en-US" altLang="ko-KR" dirty="0"/>
@@ -3015,39 +3002,36 @@
             <a:endParaRPr lang="en-US" altLang="ko-KR" dirty="0"/>
           </a:p>
           <a:p>
-            <a:pPr marL="171450" indent="-171450">
-              <a:buFont typeface="Arial" panose="020B0604020202020204" pitchFamily="34" charset="0"/>
-              <a:buChar char="•"/>
-            </a:pPr>
-            <a:r>
-              <a:rPr lang="en-US" altLang="ko-KR" dirty="0"/>
-              <a:t>Sync / Blocking</a:t>
-            </a:r>
-          </a:p>
-          <a:p>
-            <a:pPr marL="514350" lvl="1" indent="-171450">
-              <a:buFont typeface="Arial" panose="020B0604020202020204" pitchFamily="34" charset="0"/>
-              <a:buChar char="•"/>
-            </a:pPr>
-            <a:r>
-              <a:rPr lang="ko-KR" altLang="en-US" dirty="0"/>
-              <a:t>전화 건다 </a:t>
-            </a:r>
-            <a:r>
-              <a:rPr lang="en-US" altLang="ko-KR" dirty="0"/>
-              <a:t>-&gt; </a:t>
-            </a:r>
-            <a:r>
-              <a:rPr lang="ko-KR" altLang="en-US" dirty="0"/>
-              <a:t>상대방과 대화한다</a:t>
-            </a:r>
-            <a:r>
-              <a:rPr lang="en-US" altLang="ko-KR" dirty="0"/>
-              <a:t>. -&gt; </a:t>
-            </a:r>
-            <a:r>
-              <a:rPr lang="ko-KR" altLang="en-US" dirty="0"/>
-              <a:t>전화 끊고 원래 업무 마무리 한다</a:t>
+            <a:endParaRPr lang="en-US" altLang="ko-KR" dirty="0"/>
+          </a:p>
+          <a:p>
+            <a:r>
+              <a:rPr lang="ko-KR" altLang="en-US" dirty="0"/>
+              <a:t>저희도 </a:t>
+            </a:r>
+            <a:r>
+              <a:rPr lang="en-US" altLang="ko-KR" dirty="0" err="1"/>
+              <a:t>Javascript</a:t>
+            </a:r>
+            <a:r>
+              <a:rPr lang="ko-KR" altLang="en-US" dirty="0"/>
+              <a:t>나 </a:t>
+            </a:r>
+            <a:r>
+              <a:rPr lang="en-US" altLang="ko-KR" dirty="0"/>
+              <a:t>Node.js</a:t>
+            </a:r>
+            <a:r>
+              <a:rPr lang="ko-KR" altLang="en-US" dirty="0"/>
+              <a:t>처럼 </a:t>
+            </a:r>
+            <a:r>
+              <a:rPr lang="en-US" altLang="ko-KR" dirty="0"/>
+              <a:t>Async Non-blocking </a:t>
+            </a:r>
+            <a:r>
+              <a:rPr lang="ko-KR" altLang="en-US" dirty="0"/>
+              <a:t>한 처리를 하고 싶어요</a:t>
             </a:r>
             <a:r>
               <a:rPr lang="en-US" altLang="ko-KR" dirty="0"/>
@@ -3055,215 +3039,20 @@
             </a:r>
           </a:p>
           <a:p>
-            <a:pPr marL="171450" lvl="0" indent="-171450">
-              <a:buFont typeface="Arial" panose="020B0604020202020204" pitchFamily="34" charset="0"/>
-              <a:buChar char="•"/>
-            </a:pPr>
-            <a:r>
-              <a:rPr lang="en-US" altLang="ko-KR" dirty="0"/>
-              <a:t>Sync / Non-Blocking</a:t>
-            </a:r>
-          </a:p>
-          <a:p>
-            <a:pPr marL="514350" lvl="1" indent="-171450">
-              <a:buFont typeface="Arial" panose="020B0604020202020204" pitchFamily="34" charset="0"/>
-              <a:buChar char="•"/>
-            </a:pPr>
-            <a:r>
-              <a:rPr lang="ko-KR" altLang="en-US" dirty="0"/>
-              <a:t>채팅으로 상대방에게 물어본다 </a:t>
-            </a:r>
-            <a:r>
-              <a:rPr lang="en-US" altLang="ko-KR" dirty="0"/>
-              <a:t>-&gt; </a:t>
-            </a:r>
-            <a:r>
-              <a:rPr lang="ko-KR" altLang="en-US" dirty="0"/>
-              <a:t>다른 일 한다 </a:t>
-            </a:r>
-            <a:r>
-              <a:rPr lang="en-US" altLang="ko-KR" dirty="0"/>
-              <a:t>-&gt; </a:t>
-            </a:r>
-            <a:r>
-              <a:rPr lang="ko-KR" altLang="en-US" dirty="0"/>
-              <a:t>상대방이 답변 했나 확인한다 </a:t>
-            </a:r>
-            <a:r>
-              <a:rPr lang="en-US" altLang="ko-KR" dirty="0"/>
-              <a:t>-&gt; </a:t>
-            </a:r>
-            <a:r>
-              <a:rPr lang="ko-KR" altLang="en-US" dirty="0"/>
-              <a:t>다른 일 한다 </a:t>
-            </a:r>
-            <a:r>
-              <a:rPr lang="en-US" altLang="ko-KR" dirty="0"/>
-              <a:t>-&gt; </a:t>
-            </a:r>
-            <a:r>
-              <a:rPr lang="ko-KR" altLang="en-US" dirty="0"/>
-              <a:t>상대방 답변 왔는지 다시 확인한다</a:t>
-            </a:r>
-            <a:r>
-              <a:rPr lang="en-US" altLang="ko-KR" dirty="0"/>
-              <a:t>. </a:t>
-            </a:r>
-            <a:r>
-              <a:rPr lang="ko-KR" altLang="en-US" dirty="0"/>
-              <a:t>답변 받았으면 이어서 질문 계속 이어간다</a:t>
-            </a:r>
-            <a:r>
-              <a:rPr lang="en-US" altLang="ko-KR" dirty="0"/>
-              <a:t>.</a:t>
-            </a:r>
-          </a:p>
-          <a:p>
-            <a:pPr marL="171450" lvl="0" indent="-171450">
-              <a:buFont typeface="Arial" panose="020B0604020202020204" pitchFamily="34" charset="0"/>
-              <a:buChar char="•"/>
-            </a:pPr>
-            <a:r>
-              <a:rPr lang="en-US" altLang="ko-KR" dirty="0"/>
-              <a:t>Async / Blocking</a:t>
-            </a:r>
-          </a:p>
-          <a:p>
-            <a:pPr marL="514350" lvl="1" indent="-171450">
-              <a:buFont typeface="Arial" panose="020B0604020202020204" pitchFamily="34" charset="0"/>
-              <a:buChar char="•"/>
-            </a:pPr>
-            <a:r>
-              <a:rPr lang="ko-KR" altLang="en-US" dirty="0"/>
-              <a:t>이메일로 사장님께 물어본다 </a:t>
-            </a:r>
-            <a:r>
-              <a:rPr lang="en-US" altLang="ko-KR" dirty="0"/>
-              <a:t>-&gt; </a:t>
-            </a:r>
-            <a:r>
-              <a:rPr lang="ko-KR" altLang="en-US" dirty="0"/>
-              <a:t>사장님 답변 초조하게 기다린다 </a:t>
-            </a:r>
-            <a:r>
-              <a:rPr lang="en-US" altLang="ko-KR" dirty="0"/>
-              <a:t>-&gt; </a:t>
-            </a:r>
-            <a:r>
-              <a:rPr lang="ko-KR" altLang="en-US" dirty="0"/>
-              <a:t>사장님 메일 받았다</a:t>
-            </a:r>
-            <a:r>
-              <a:rPr lang="en-US" altLang="ko-KR" dirty="0"/>
-              <a:t>. </a:t>
-            </a:r>
-            <a:r>
-              <a:rPr lang="ko-KR" altLang="en-US" dirty="0"/>
-              <a:t>지시사항대로 움직인다</a:t>
-            </a:r>
-            <a:r>
-              <a:rPr lang="en-US" altLang="ko-KR" dirty="0"/>
-              <a:t>.</a:t>
-            </a:r>
-          </a:p>
-          <a:p>
-            <a:pPr marL="171450" lvl="0" indent="-171450">
-              <a:buFont typeface="Arial" panose="020B0604020202020204" pitchFamily="34" charset="0"/>
-              <a:buChar char="•"/>
-            </a:pPr>
-            <a:r>
-              <a:rPr lang="en-US" altLang="ko-KR" dirty="0"/>
-              <a:t>Async / Non-blocking</a:t>
-            </a:r>
-          </a:p>
-          <a:p>
-            <a:pPr marL="514350" lvl="1" indent="-171450">
-              <a:buFont typeface="Arial" panose="020B0604020202020204" pitchFamily="34" charset="0"/>
-              <a:buChar char="•"/>
-            </a:pPr>
-            <a:r>
-              <a:rPr lang="ko-KR" altLang="en-US" dirty="0"/>
-              <a:t>이메일로 팀장님께 휴가 언제 써도 되는지 물어본다 </a:t>
-            </a:r>
-            <a:r>
-              <a:rPr lang="en-US" altLang="ko-KR" dirty="0"/>
-              <a:t>-&gt; </a:t>
-            </a:r>
-            <a:r>
-              <a:rPr lang="ko-KR" altLang="en-US" dirty="0"/>
-              <a:t>다른 일 한다 </a:t>
-            </a:r>
-            <a:r>
-              <a:rPr lang="en-US" altLang="ko-KR" dirty="0"/>
-              <a:t>-&gt; </a:t>
-            </a:r>
-            <a:r>
-              <a:rPr lang="ko-KR" altLang="en-US" dirty="0"/>
-              <a:t>팀장님한테 휴가 다음 주부터 사용 </a:t>
-            </a:r>
-            <a:r>
-              <a:rPr lang="ko-KR" altLang="en-US" dirty="0" err="1"/>
-              <a:t>가능하다로</a:t>
-            </a:r>
-            <a:r>
-              <a:rPr lang="ko-KR" altLang="en-US" dirty="0"/>
-              <a:t> 연락 받았다</a:t>
-            </a:r>
-            <a:r>
-              <a:rPr lang="en-US" altLang="ko-KR" dirty="0"/>
-              <a:t>. </a:t>
-            </a:r>
-            <a:r>
-              <a:rPr lang="ko-KR" altLang="en-US" dirty="0"/>
-              <a:t>휴가 신청작업에 들어간다</a:t>
-            </a:r>
-            <a:r>
-              <a:rPr lang="en-US" altLang="ko-KR" dirty="0"/>
-              <a:t>.</a:t>
-            </a:r>
-            <a:r>
-              <a:rPr lang="ko-KR" altLang="en-US" dirty="0"/>
-              <a:t> </a:t>
-            </a:r>
             <a:endParaRPr lang="en-US" altLang="ko-KR" dirty="0"/>
           </a:p>
           <a:p>
-            <a:pPr marL="228600" indent="-228600">
-              <a:buAutoNum type="arabicPeriod"/>
-            </a:pPr>
-            <a:endParaRPr lang="en-US" altLang="ko-KR" dirty="0"/>
-          </a:p>
-          <a:p>
-            <a:endParaRPr lang="en-US" altLang="ko-KR" dirty="0"/>
-          </a:p>
-          <a:p>
-            <a:r>
-              <a:rPr lang="ko-KR" altLang="en-US" dirty="0"/>
-              <a:t>저희 최종 목적지는 </a:t>
-            </a:r>
-            <a:r>
-              <a:rPr lang="en-US" altLang="ko-KR" dirty="0"/>
-              <a:t>Async Non-blocking </a:t>
-            </a:r>
-            <a:r>
-              <a:rPr lang="ko-KR" altLang="en-US" dirty="0"/>
-              <a:t>한 처리입니다</a:t>
-            </a:r>
-            <a:r>
-              <a:rPr lang="en-US" altLang="ko-KR" dirty="0"/>
-              <a:t>. </a:t>
-            </a:r>
             <a:r>
               <a:rPr lang="ko-KR" altLang="en-US" dirty="0"/>
               <a:t>간단한 실습을 통해 </a:t>
             </a:r>
             <a:r>
               <a:rPr lang="en-US" altLang="ko-KR" dirty="0"/>
-              <a:t>Sync/Async, Blocking/Non-Blocking</a:t>
-            </a:r>
-            <a:r>
-              <a:rPr lang="ko-KR" altLang="en-US" dirty="0"/>
-              <a:t>이 코드에 각각 어떻게 대응되는지 확인해 보도록 하겠습니다</a:t>
+              <a:t>Sync/Async, Blocking/Non-Blocking </a:t>
+            </a:r>
+            <a:r>
+              <a:rPr lang="ko-KR" altLang="en-US" dirty="0"/>
+              <a:t>개념이 코드에서 어떻게 대응되는지 확인해 보도록 하겠습니다</a:t>
             </a:r>
             <a:r>
               <a:rPr lang="en-US" altLang="ko-KR" dirty="0"/>
@@ -14570,7 +14359,7 @@
             </a:avLst>
           </a:prstGeom>
           <a:noFill/>
-          <a:ln>
+          <a:ln w="28575">
             <a:solidFill>
               <a:srgbClr val="C00000"/>
             </a:solidFill>
@@ -14637,6 +14426,64 @@
               <a:t>https://gngsn.tistory.com/154</a:t>
             </a:r>
             <a:endParaRPr lang="ko-KR" altLang="en-US" sz="1100" dirty="0"/>
+          </a:p>
+        </p:txBody>
+      </p:sp>
+      <p:sp>
+        <p:nvSpPr>
+          <p:cNvPr id="3" name="사각형: 둥근 모서리 2">
+            <a:extLst>
+              <a:ext uri="{FF2B5EF4-FFF2-40B4-BE49-F238E27FC236}">
+                <a16:creationId xmlns:a16="http://schemas.microsoft.com/office/drawing/2014/main" id="{94A67616-2170-5EC1-7B75-9D0C2802A37C}"/>
+              </a:ext>
+            </a:extLst>
+          </p:cNvPr>
+          <p:cNvSpPr/>
+          <p:nvPr/>
+        </p:nvSpPr>
+        <p:spPr>
+          <a:xfrm>
+            <a:off x="2162441" y="1563616"/>
+            <a:ext cx="1983830" cy="1711569"/>
+          </a:xfrm>
+          <a:prstGeom prst="roundRect">
+            <a:avLst>
+              <a:gd name="adj" fmla="val 5536"/>
+            </a:avLst>
+          </a:prstGeom>
+          <a:noFill/>
+          <a:ln w="28575">
+            <a:solidFill>
+              <a:srgbClr val="008000"/>
+            </a:solidFill>
+          </a:ln>
+        </p:spPr>
+        <p:style>
+          <a:lnRef idx="2">
+            <a:schemeClr val="accent1">
+              <a:shade val="15000"/>
+            </a:schemeClr>
+          </a:lnRef>
+          <a:fillRef idx="1">
+            <a:schemeClr val="accent1"/>
+          </a:fillRef>
+          <a:effectRef idx="0">
+            <a:schemeClr val="accent1"/>
+          </a:effectRef>
+          <a:fontRef idx="minor">
+            <a:schemeClr val="lt1"/>
+          </a:fontRef>
+        </p:style>
+        <p:txBody>
+          <a:bodyPr rtlCol="0" anchor="ctr"/>
+          <a:lstStyle/>
+          <a:p>
+            <a:pPr algn="ctr"/>
+            <a:endParaRPr lang="ko-KR" altLang="en-US">
+              <a:solidFill>
+                <a:srgbClr val="008000"/>
+              </a:solidFill>
+            </a:endParaRPr>
           </a:p>
         </p:txBody>
       </p:sp>
@@ -14753,17 +14600,19 @@
             </a:pPr>
             <a:r>
               <a:rPr lang="en-US" altLang="ko-KR" dirty="0"/>
-              <a:t>Blocking / Non-Blocking</a:t>
-            </a:r>
-          </a:p>
-          <a:p>
-            <a:pPr marL="0" indent="0">
+              <a:t>Synchronous Blocking / Non-Blocking</a:t>
+            </a:r>
+          </a:p>
+          <a:p>
+            <a:pPr lvl="1">
               <a:lnSpc>
                 <a:spcPct val="150000"/>
               </a:lnSpc>
-              <a:buNone/>
             </a:pPr>
-            <a:endParaRPr lang="en-US" altLang="ko-KR" dirty="0"/>
+            <a:r>
+              <a:rPr lang="en-US" altLang="ko-KR" dirty="0"/>
+              <a:t>Asynchronous Blocking / Non-Blocking</a:t>
+            </a:r>
           </a:p>
           <a:p>
             <a:pPr marL="0" indent="0">

</xml_diff>

<commit_message>
thread context switching 설명 수정
</commit_message>
<xml_diff>
--- a/99.ppt/[Ch4-1. 비동기 서비스 소개] 1-2. 비동기 호출이란 ~ 1-3. Servlet_Reactive.pptx
+++ b/99.ppt/[Ch4-1. 비동기 서비스 소개] 1-2. 비동기 호출이란 ~ 1-3. Servlet_Reactive.pptx
@@ -228,7 +228,7 @@
           <a:p>
             <a:fld id="{9B770909-2C76-4DF9-BB76-4EE283593418}" type="datetimeFigureOut">
               <a:rPr lang="ko-KR" altLang="en-US" smtClean="0"/>
-              <a:t>2023-07-17</a:t>
+              <a:t>2023-07-18</a:t>
             </a:fld>
             <a:endParaRPr lang="ko-KR" altLang="en-US"/>
           </a:p>
@@ -1129,356 +1129,6 @@
             <a:endParaRPr lang="en-US" altLang="ko-KR" dirty="0"/>
           </a:p>
           <a:p>
-            <a:r>
-              <a:rPr lang="ko-KR" altLang="en-US" dirty="0"/>
-              <a:t>네트워크 지연 등으로 </a:t>
-            </a:r>
-            <a:r>
-              <a:rPr lang="en-US" altLang="ko-KR" dirty="0"/>
-              <a:t>I/O blocking</a:t>
-            </a:r>
-            <a:r>
-              <a:rPr lang="ko-KR" altLang="en-US" dirty="0"/>
-              <a:t>이 발생하면</a:t>
-            </a:r>
-            <a:r>
-              <a:rPr lang="en-US" altLang="ko-KR" dirty="0"/>
-              <a:t>, thread</a:t>
-            </a:r>
-            <a:r>
-              <a:rPr lang="ko-KR" altLang="en-US" dirty="0"/>
-              <a:t>는 </a:t>
-            </a:r>
-            <a:r>
-              <a:rPr lang="en-US" altLang="ko-KR" dirty="0"/>
-              <a:t>wait </a:t>
-            </a:r>
-            <a:r>
-              <a:rPr lang="ko-KR" altLang="en-US" dirty="0"/>
-              <a:t>상태로 바뀌고</a:t>
-            </a:r>
-            <a:r>
-              <a:rPr lang="en-US" altLang="ko-KR" dirty="0"/>
-              <a:t>, </a:t>
-            </a:r>
-            <a:r>
-              <a:rPr lang="ko-KR" altLang="en-US" dirty="0"/>
-              <a:t>다른 </a:t>
-            </a:r>
-            <a:r>
-              <a:rPr lang="en-US" altLang="ko-KR" dirty="0"/>
-              <a:t>thread</a:t>
-            </a:r>
-            <a:r>
-              <a:rPr lang="ko-KR" altLang="en-US" dirty="0"/>
-              <a:t>가 </a:t>
-            </a:r>
-            <a:r>
-              <a:rPr lang="en-US" altLang="ko-KR" dirty="0"/>
-              <a:t>core</a:t>
-            </a:r>
-            <a:r>
-              <a:rPr lang="ko-KR" altLang="en-US" dirty="0"/>
-              <a:t>를 사용할 수 있도록 자리를 양보합니다</a:t>
-            </a:r>
-            <a:r>
-              <a:rPr lang="en-US" altLang="ko-KR" dirty="0"/>
-              <a:t>.</a:t>
-            </a:r>
-          </a:p>
-          <a:p>
-            <a:r>
-              <a:rPr lang="ko-KR" altLang="en-US" dirty="0"/>
-              <a:t>소켓에 신호가 들어오면 </a:t>
-            </a:r>
-            <a:r>
-              <a:rPr lang="en-US" altLang="ko-KR" dirty="0"/>
-              <a:t>OS</a:t>
-            </a:r>
-            <a:r>
-              <a:rPr lang="ko-KR" altLang="en-US" dirty="0"/>
-              <a:t>는 잠자던 </a:t>
-            </a:r>
-            <a:r>
-              <a:rPr lang="en-US" altLang="ko-KR" dirty="0"/>
-              <a:t>thread</a:t>
-            </a:r>
-            <a:r>
-              <a:rPr lang="ko-KR" altLang="en-US" dirty="0"/>
-              <a:t>를 깨워 </a:t>
-            </a:r>
-            <a:r>
-              <a:rPr lang="en-US" altLang="ko-KR" dirty="0"/>
-              <a:t>runnable </a:t>
-            </a:r>
-            <a:r>
-              <a:rPr lang="ko-KR" altLang="en-US" dirty="0"/>
-              <a:t>상태로 변경합니다</a:t>
-            </a:r>
-            <a:r>
-              <a:rPr lang="en-US" altLang="ko-KR" dirty="0"/>
-              <a:t>. </a:t>
-            </a:r>
-            <a:r>
-              <a:rPr lang="ko-KR" altLang="en-US" dirty="0"/>
-              <a:t>그리고 </a:t>
-            </a:r>
-            <a:r>
-              <a:rPr lang="en-US" altLang="ko-KR" dirty="0"/>
-              <a:t>idle </a:t>
-            </a:r>
-            <a:r>
-              <a:rPr lang="ko-KR" altLang="en-US" dirty="0"/>
-              <a:t>상태인 </a:t>
-            </a:r>
-            <a:r>
-              <a:rPr lang="en-US" altLang="ko-KR" dirty="0"/>
-              <a:t>core</a:t>
-            </a:r>
-            <a:r>
-              <a:rPr lang="ko-KR" altLang="en-US" dirty="0"/>
-              <a:t>가 나타나면 그 곳에서 </a:t>
-            </a:r>
-            <a:r>
-              <a:rPr lang="en-US" altLang="ko-KR" dirty="0"/>
-              <a:t>thread </a:t>
-            </a:r>
-            <a:r>
-              <a:rPr lang="ko-KR" altLang="en-US" dirty="0"/>
-              <a:t>실행이 재개됩니다</a:t>
-            </a:r>
-            <a:r>
-              <a:rPr lang="en-US" altLang="ko-KR" dirty="0"/>
-              <a:t>.</a:t>
-            </a:r>
-          </a:p>
-          <a:p>
-            <a:endParaRPr lang="en-US" altLang="ko-KR" dirty="0"/>
-          </a:p>
-          <a:p>
-            <a:r>
-              <a:rPr lang="en-US" altLang="ko-KR" dirty="0"/>
-              <a:t>OS</a:t>
-            </a:r>
-            <a:r>
-              <a:rPr lang="ko-KR" altLang="en-US" dirty="0"/>
-              <a:t>에서 제어해주는 </a:t>
-            </a:r>
-            <a:r>
-              <a:rPr lang="en-US" altLang="ko-KR" dirty="0"/>
-              <a:t>thread</a:t>
-            </a:r>
-            <a:r>
-              <a:rPr lang="ko-KR" altLang="en-US" dirty="0"/>
-              <a:t>와 </a:t>
-            </a:r>
-            <a:r>
-              <a:rPr lang="en-US" altLang="ko-KR" dirty="0"/>
-              <a:t>core</a:t>
-            </a:r>
-            <a:r>
-              <a:rPr lang="ko-KR" altLang="en-US" dirty="0"/>
-              <a:t>의 관계는</a:t>
-            </a:r>
-            <a:r>
-              <a:rPr lang="en-US" altLang="ko-KR" dirty="0"/>
-              <a:t>, event loop</a:t>
-            </a:r>
-            <a:r>
-              <a:rPr lang="ko-KR" altLang="en-US" dirty="0"/>
-              <a:t>의 </a:t>
-            </a:r>
-            <a:r>
-              <a:rPr lang="en-US" altLang="ko-KR" dirty="0"/>
-              <a:t>task</a:t>
-            </a:r>
-            <a:r>
-              <a:rPr lang="ko-KR" altLang="en-US" dirty="0"/>
-              <a:t>와 </a:t>
-            </a:r>
-            <a:r>
-              <a:rPr lang="en-US" altLang="ko-KR" dirty="0"/>
-              <a:t>thread</a:t>
-            </a:r>
-            <a:r>
-              <a:rPr lang="ko-KR" altLang="en-US" dirty="0"/>
-              <a:t>의 관계와 유사해 보입니다</a:t>
-            </a:r>
-            <a:r>
-              <a:rPr lang="en-US" altLang="ko-KR" dirty="0"/>
-              <a:t>.</a:t>
-            </a:r>
-          </a:p>
-          <a:p>
-            <a:r>
-              <a:rPr lang="ko-KR" altLang="en-US" dirty="0"/>
-              <a:t>복잡한 처리를 하지 않아도 자동으로 분할실행을 관리해 준다는 점에서 오히려 </a:t>
-            </a:r>
-            <a:r>
-              <a:rPr lang="ko-KR" altLang="en-US" dirty="0" err="1"/>
-              <a:t>좋아보이기까지</a:t>
-            </a:r>
-            <a:r>
-              <a:rPr lang="ko-KR" altLang="en-US" dirty="0"/>
-              <a:t> 하는데요</a:t>
-            </a:r>
-            <a:r>
-              <a:rPr lang="en-US" altLang="ko-KR" dirty="0"/>
-              <a:t>.</a:t>
-            </a:r>
-          </a:p>
-          <a:p>
-            <a:endParaRPr lang="en-US" altLang="ko-KR" dirty="0"/>
-          </a:p>
-          <a:p>
-            <a:r>
-              <a:rPr lang="en-US" altLang="ko-KR" dirty="0"/>
-              <a:t>blocking </a:t>
-            </a:r>
-            <a:r>
-              <a:rPr lang="ko-KR" altLang="en-US" dirty="0"/>
-              <a:t>이 대체 뭐가 문제란 걸까요 </a:t>
-            </a:r>
-            <a:r>
-              <a:rPr lang="en-US" altLang="ko-KR" dirty="0"/>
-              <a:t>?</a:t>
-            </a:r>
-          </a:p>
-          <a:p>
-            <a:endParaRPr lang="en-US" altLang="ko-KR" dirty="0"/>
-          </a:p>
-          <a:p>
-            <a:endParaRPr lang="en-US" altLang="ko-KR" dirty="0"/>
-          </a:p>
-          <a:p>
-            <a:r>
-              <a:rPr lang="en-US" altLang="ko-KR" b="1" dirty="0"/>
-              <a:t>Context switching</a:t>
-            </a:r>
-          </a:p>
-          <a:p>
-            <a:endParaRPr lang="en-US" altLang="ko-KR" dirty="0"/>
-          </a:p>
-          <a:p>
-            <a:r>
-              <a:rPr lang="en-US" altLang="ko-KR" dirty="0"/>
-              <a:t>Thread</a:t>
-            </a:r>
-            <a:r>
-              <a:rPr lang="ko-KR" altLang="en-US" dirty="0"/>
-              <a:t> 가 </a:t>
-            </a:r>
-            <a:r>
-              <a:rPr lang="en-US" altLang="ko-KR" dirty="0"/>
-              <a:t>I/O blocking</a:t>
-            </a:r>
-            <a:r>
-              <a:rPr lang="ko-KR" altLang="en-US" dirty="0"/>
-              <a:t>이 발생해서 멈춤 상태이거나</a:t>
-            </a:r>
-            <a:r>
-              <a:rPr lang="en-US" altLang="ko-KR" dirty="0"/>
-              <a:t>, </a:t>
-            </a:r>
-            <a:r>
-              <a:rPr lang="ko-KR" altLang="en-US" dirty="0"/>
-              <a:t>또는 </a:t>
-            </a:r>
-            <a:r>
-              <a:rPr lang="en-US" altLang="ko-KR" dirty="0"/>
-              <a:t>sleep </a:t>
-            </a:r>
-            <a:r>
-              <a:rPr lang="ko-KR" altLang="en-US" dirty="0"/>
-              <a:t>등으로 처리를 양보하는 경우</a:t>
-            </a:r>
-            <a:r>
-              <a:rPr lang="en-US" altLang="ko-KR" dirty="0"/>
-              <a:t>,</a:t>
-            </a:r>
-          </a:p>
-          <a:p>
-            <a:r>
-              <a:rPr lang="en-US" altLang="ko-KR" dirty="0"/>
-              <a:t>CPU </a:t>
-            </a:r>
-            <a:r>
-              <a:rPr lang="ko-KR" altLang="en-US" dirty="0"/>
-              <a:t>코어 </a:t>
-            </a:r>
-            <a:r>
-              <a:rPr lang="en-US" altLang="ko-KR" dirty="0"/>
-              <a:t>(H/W</a:t>
-            </a:r>
-            <a:r>
-              <a:rPr lang="ko-KR" altLang="en-US" dirty="0"/>
-              <a:t> 쓰레드</a:t>
-            </a:r>
-            <a:r>
-              <a:rPr lang="en-US" altLang="ko-KR" dirty="0"/>
-              <a:t>) </a:t>
-            </a:r>
-            <a:r>
-              <a:rPr lang="ko-KR" altLang="en-US" dirty="0"/>
-              <a:t>에서 다른 쓰레드를 실행하기 위해</a:t>
-            </a:r>
-            <a:r>
-              <a:rPr lang="en-US" altLang="ko-KR" dirty="0"/>
-              <a:t>, </a:t>
-            </a:r>
-            <a:r>
-              <a:rPr lang="ko-KR" altLang="en-US" dirty="0"/>
-              <a:t>이전 </a:t>
-            </a:r>
-            <a:r>
-              <a:rPr lang="en-US" altLang="ko-KR" dirty="0"/>
-              <a:t>thread </a:t>
-            </a:r>
-            <a:r>
-              <a:rPr lang="ko-KR" altLang="en-US" dirty="0"/>
-              <a:t>의 상태를 저장하고</a:t>
-            </a:r>
-            <a:r>
-              <a:rPr lang="en-US" altLang="ko-KR" dirty="0"/>
-              <a:t>, </a:t>
-            </a:r>
-            <a:r>
-              <a:rPr lang="ko-KR" altLang="en-US" dirty="0"/>
-              <a:t>실행할 </a:t>
-            </a:r>
-            <a:r>
-              <a:rPr lang="en-US" altLang="ko-KR" dirty="0"/>
-              <a:t>thread </a:t>
-            </a:r>
-            <a:r>
-              <a:rPr lang="ko-KR" altLang="en-US" dirty="0"/>
-              <a:t>의 상태를 복원합니다</a:t>
-            </a:r>
-            <a:r>
-              <a:rPr lang="en-US" altLang="ko-KR" dirty="0"/>
-              <a:t>. </a:t>
-            </a:r>
-            <a:r>
-              <a:rPr lang="ko-KR" altLang="en-US" dirty="0"/>
-              <a:t>이 과정을 </a:t>
-            </a:r>
-            <a:r>
-              <a:rPr lang="en-US" altLang="ko-KR" dirty="0"/>
-              <a:t>context switching </a:t>
-            </a:r>
-            <a:r>
-              <a:rPr lang="ko-KR" altLang="en-US" dirty="0"/>
-              <a:t>이라고 합니다</a:t>
-            </a:r>
-            <a:r>
-              <a:rPr lang="en-US" altLang="ko-KR" dirty="0"/>
-              <a:t>.</a:t>
-            </a:r>
-          </a:p>
-          <a:p>
-            <a:endParaRPr lang="en-US" altLang="ko-KR" dirty="0"/>
-          </a:p>
-          <a:p>
             <a:pPr marL="0" marR="0" lvl="0" indent="0" algn="l" defTabSz="685800" rtl="0" eaLnBrk="1" fontAlgn="auto" latinLnBrk="1" hangingPunct="1">
               <a:lnSpc>
                 <a:spcPct val="100000"/>
@@ -1497,12 +1147,588 @@
               <a:defRPr/>
             </a:pPr>
             <a:r>
-              <a:rPr lang="ko-KR" altLang="en-US" dirty="0"/>
-              <a:t>실행 컨텍스트 </a:t>
-            </a:r>
-            <a:r>
-              <a:rPr lang="en-US" altLang="ko-KR" dirty="0"/>
-              <a:t>(</a:t>
+              <a:rPr lang="en-US" altLang="ko-KR" dirty="0"/>
+              <a:t>Thread</a:t>
+            </a:r>
+            <a:r>
+              <a:rPr lang="ko-KR" altLang="en-US" dirty="0"/>
+              <a:t>에 </a:t>
+            </a:r>
+            <a:r>
+              <a:rPr lang="en-US" altLang="ko-KR" b="1" u="sng" dirty="0"/>
+              <a:t>I/O blocking, CPU </a:t>
+            </a:r>
+            <a:r>
+              <a:rPr lang="ko-KR" altLang="en-US" b="1" u="sng" dirty="0"/>
+              <a:t>사용시간 만료</a:t>
+            </a:r>
+            <a:r>
+              <a:rPr lang="en-US" altLang="ko-KR" b="1" u="sng" dirty="0"/>
+              <a:t>, </a:t>
+            </a:r>
+            <a:r>
+              <a:rPr lang="ko-KR" altLang="en-US" b="1" u="sng" dirty="0"/>
+              <a:t>자식 프로세스 생성</a:t>
+            </a:r>
+            <a:r>
+              <a:rPr lang="en-US" altLang="ko-KR" b="1" u="sng" dirty="0"/>
+              <a:t>, </a:t>
+            </a:r>
+            <a:r>
+              <a:rPr lang="ko-KR" altLang="en-US" b="1" u="sng" dirty="0"/>
+              <a:t>또는 </a:t>
+            </a:r>
+            <a:r>
+              <a:rPr lang="en-US" altLang="ko-KR" b="1" u="sng" dirty="0"/>
+              <a:t>sleep </a:t>
+            </a:r>
+            <a:r>
+              <a:rPr lang="ko-KR" altLang="en-US" b="1" u="sng" dirty="0"/>
+              <a:t>등으로 처리를 양보하는 경우</a:t>
+            </a:r>
+            <a:r>
+              <a:rPr lang="en-US" altLang="ko-KR" dirty="0"/>
+              <a:t> interrupt</a:t>
+            </a:r>
+            <a:r>
+              <a:rPr lang="ko-KR" altLang="en-US" dirty="0"/>
+              <a:t>가 발생하고</a:t>
+            </a:r>
+            <a:endParaRPr lang="en-US" altLang="ko-KR" dirty="0"/>
+          </a:p>
+          <a:p>
+            <a:pPr marL="0" marR="0" lvl="0" indent="0" algn="l" defTabSz="685800" rtl="0" eaLnBrk="1" fontAlgn="auto" latinLnBrk="1" hangingPunct="1">
+              <a:lnSpc>
+                <a:spcPct val="100000"/>
+              </a:lnSpc>
+              <a:spcBef>
+                <a:spcPts val="0"/>
+              </a:spcBef>
+              <a:spcAft>
+                <a:spcPts val="0"/>
+              </a:spcAft>
+              <a:buClrTx/>
+              <a:buSzTx/>
+              <a:buFontTx/>
+              <a:buNone/>
+              <a:tabLst/>
+              <a:defRPr/>
+            </a:pPr>
+            <a:endParaRPr lang="en-US" altLang="ko-KR" dirty="0"/>
+          </a:p>
+          <a:p>
+            <a:pPr marL="0" marR="0" lvl="0" indent="0" algn="l" defTabSz="685800" rtl="0" eaLnBrk="1" fontAlgn="auto" latinLnBrk="1" hangingPunct="1">
+              <a:lnSpc>
+                <a:spcPct val="100000"/>
+              </a:lnSpc>
+              <a:spcBef>
+                <a:spcPts val="0"/>
+              </a:spcBef>
+              <a:spcAft>
+                <a:spcPts val="0"/>
+              </a:spcAft>
+              <a:buClrTx/>
+              <a:buSzTx/>
+              <a:buFontTx/>
+              <a:buNone/>
+              <a:tabLst/>
+              <a:defRPr/>
+            </a:pPr>
+            <a:r>
+              <a:rPr lang="en-US" altLang="ko-KR" dirty="0"/>
+              <a:t>OS </a:t>
+            </a:r>
+            <a:r>
+              <a:rPr lang="ko-KR" altLang="en-US" dirty="0"/>
+              <a:t>커널은 </a:t>
+            </a:r>
+            <a:r>
+              <a:rPr lang="en-US" altLang="ko-KR" dirty="0"/>
+              <a:t>interrupt</a:t>
+            </a:r>
+            <a:r>
+              <a:rPr lang="ko-KR" altLang="en-US" dirty="0"/>
+              <a:t>가 발생한 </a:t>
+            </a:r>
+            <a:r>
+              <a:rPr lang="en-US" altLang="ko-KR" dirty="0"/>
+              <a:t>thread</a:t>
+            </a:r>
+            <a:r>
+              <a:rPr lang="ko-KR" altLang="en-US" dirty="0"/>
+              <a:t> 는 </a:t>
+            </a:r>
+            <a:r>
+              <a:rPr lang="en-US" altLang="ko-KR" dirty="0"/>
+              <a:t>wait </a:t>
+            </a:r>
+            <a:r>
+              <a:rPr lang="ko-KR" altLang="en-US" dirty="0"/>
+              <a:t>상태로 마킹하고 실행을 중지시키고</a:t>
+            </a:r>
+            <a:r>
+              <a:rPr lang="en-US" altLang="ko-KR" dirty="0"/>
+              <a:t>, runnable </a:t>
+            </a:r>
+            <a:r>
+              <a:rPr lang="ko-KR" altLang="en-US" dirty="0"/>
+              <a:t>상태로 </a:t>
+            </a:r>
+            <a:r>
+              <a:rPr lang="ko-KR" altLang="en-US" dirty="0" err="1"/>
+              <a:t>마킹되어</a:t>
+            </a:r>
+            <a:r>
+              <a:rPr lang="ko-KR" altLang="en-US" dirty="0"/>
+              <a:t> 있는 다른 </a:t>
+            </a:r>
+            <a:r>
+              <a:rPr lang="en-US" altLang="ko-KR" dirty="0"/>
+              <a:t>thread </a:t>
+            </a:r>
+            <a:r>
+              <a:rPr lang="ko-KR" altLang="en-US" dirty="0"/>
+              <a:t>를 실행합니다</a:t>
+            </a:r>
+            <a:r>
+              <a:rPr lang="en-US" altLang="ko-KR" dirty="0"/>
+              <a:t>.</a:t>
+            </a:r>
+          </a:p>
+          <a:p>
+            <a:pPr marL="0" marR="0" lvl="0" indent="0" algn="l" defTabSz="685800" rtl="0" eaLnBrk="1" fontAlgn="auto" latinLnBrk="1" hangingPunct="1">
+              <a:lnSpc>
+                <a:spcPct val="100000"/>
+              </a:lnSpc>
+              <a:spcBef>
+                <a:spcPts val="0"/>
+              </a:spcBef>
+              <a:spcAft>
+                <a:spcPts val="0"/>
+              </a:spcAft>
+              <a:buClrTx/>
+              <a:buSzTx/>
+              <a:buFontTx/>
+              <a:buNone/>
+              <a:tabLst/>
+              <a:defRPr/>
+            </a:pPr>
+            <a:endParaRPr lang="en-US" altLang="ko-KR" dirty="0"/>
+          </a:p>
+          <a:p>
+            <a:pPr marL="0" marR="0" lvl="0" indent="0" algn="l" defTabSz="685800" rtl="0" eaLnBrk="1" fontAlgn="auto" latinLnBrk="1" hangingPunct="1">
+              <a:lnSpc>
+                <a:spcPct val="100000"/>
+              </a:lnSpc>
+              <a:spcBef>
+                <a:spcPts val="0"/>
+              </a:spcBef>
+              <a:spcAft>
+                <a:spcPts val="0"/>
+              </a:spcAft>
+              <a:buClrTx/>
+              <a:buSzTx/>
+              <a:buFontTx/>
+              <a:buNone/>
+              <a:tabLst/>
+              <a:defRPr/>
+            </a:pPr>
+            <a:r>
+              <a:rPr lang="ko-KR" altLang="en-US" dirty="0"/>
+              <a:t>즉 </a:t>
+            </a:r>
+            <a:r>
+              <a:rPr lang="en-US" altLang="ko-KR" dirty="0"/>
+              <a:t>Core</a:t>
+            </a:r>
+            <a:r>
+              <a:rPr lang="ko-KR" altLang="en-US" dirty="0"/>
+              <a:t>는 노는 시간이 없다는 건데요</a:t>
+            </a:r>
+            <a:r>
+              <a:rPr lang="en-US" altLang="ko-KR" dirty="0"/>
+              <a:t>.</a:t>
+            </a:r>
+          </a:p>
+          <a:p>
+            <a:pPr marL="0" marR="0" lvl="0" indent="0" algn="l" defTabSz="685800" rtl="0" eaLnBrk="1" fontAlgn="auto" latinLnBrk="1" hangingPunct="1">
+              <a:lnSpc>
+                <a:spcPct val="100000"/>
+              </a:lnSpc>
+              <a:spcBef>
+                <a:spcPts val="0"/>
+              </a:spcBef>
+              <a:spcAft>
+                <a:spcPts val="0"/>
+              </a:spcAft>
+              <a:buClrTx/>
+              <a:buSzTx/>
+              <a:buFontTx/>
+              <a:buNone/>
+              <a:tabLst/>
+              <a:defRPr/>
+            </a:pPr>
+            <a:endParaRPr lang="en-US" altLang="ko-KR" dirty="0"/>
+          </a:p>
+          <a:p>
+            <a:pPr marL="0" marR="0" lvl="0" indent="0" algn="l" defTabSz="685800" rtl="0" eaLnBrk="1" fontAlgn="auto" latinLnBrk="1" hangingPunct="1">
+              <a:lnSpc>
+                <a:spcPct val="100000"/>
+              </a:lnSpc>
+              <a:spcBef>
+                <a:spcPts val="0"/>
+              </a:spcBef>
+              <a:spcAft>
+                <a:spcPts val="0"/>
+              </a:spcAft>
+              <a:buClrTx/>
+              <a:buSzTx/>
+              <a:buFontTx/>
+              <a:buNone/>
+              <a:tabLst/>
+              <a:defRPr/>
+            </a:pPr>
+            <a:r>
+              <a:rPr lang="en-US" altLang="ko-KR" dirty="0"/>
+              <a:t>…</a:t>
+            </a:r>
+          </a:p>
+          <a:p>
+            <a:pPr marL="0" marR="0" lvl="0" indent="0" algn="l" defTabSz="685800" rtl="0" eaLnBrk="1" fontAlgn="auto" latinLnBrk="1" hangingPunct="1">
+              <a:lnSpc>
+                <a:spcPct val="100000"/>
+              </a:lnSpc>
+              <a:spcBef>
+                <a:spcPts val="0"/>
+              </a:spcBef>
+              <a:spcAft>
+                <a:spcPts val="0"/>
+              </a:spcAft>
+              <a:buClrTx/>
+              <a:buSzTx/>
+              <a:buFontTx/>
+              <a:buNone/>
+              <a:tabLst/>
+              <a:defRPr/>
+            </a:pPr>
+            <a:endParaRPr lang="en-US" altLang="ko-KR" dirty="0"/>
+          </a:p>
+          <a:p>
+            <a:pPr marL="0" marR="0" lvl="0" indent="0" algn="l" defTabSz="685800" rtl="0" eaLnBrk="1" fontAlgn="auto" latinLnBrk="1" hangingPunct="1">
+              <a:lnSpc>
+                <a:spcPct val="100000"/>
+              </a:lnSpc>
+              <a:spcBef>
+                <a:spcPts val="0"/>
+              </a:spcBef>
+              <a:spcAft>
+                <a:spcPts val="0"/>
+              </a:spcAft>
+              <a:buClrTx/>
+              <a:buSzTx/>
+              <a:buFontTx/>
+              <a:buNone/>
+              <a:tabLst/>
+              <a:defRPr/>
+            </a:pPr>
+            <a:r>
+              <a:rPr lang="en-US" altLang="ko-KR" dirty="0"/>
+              <a:t>Thread</a:t>
+            </a:r>
+            <a:r>
+              <a:rPr lang="ko-KR" altLang="en-US" dirty="0"/>
+              <a:t>의 </a:t>
+            </a:r>
+            <a:r>
+              <a:rPr lang="en-US" altLang="ko-KR" dirty="0"/>
+              <a:t>I/O blocking </a:t>
+            </a:r>
+            <a:r>
+              <a:rPr lang="ko-KR" altLang="en-US" dirty="0"/>
+              <a:t>이 대체 뭐가 문제란 걸까요 </a:t>
+            </a:r>
+            <a:r>
+              <a:rPr lang="en-US" altLang="ko-KR" dirty="0"/>
+              <a:t>?</a:t>
+            </a:r>
+          </a:p>
+          <a:p>
+            <a:pPr marL="0" marR="0" lvl="0" indent="0" algn="l" defTabSz="685800" rtl="0" eaLnBrk="1" fontAlgn="auto" latinLnBrk="1" hangingPunct="1">
+              <a:lnSpc>
+                <a:spcPct val="100000"/>
+              </a:lnSpc>
+              <a:spcBef>
+                <a:spcPts val="0"/>
+              </a:spcBef>
+              <a:spcAft>
+                <a:spcPts val="0"/>
+              </a:spcAft>
+              <a:buClrTx/>
+              <a:buSzTx/>
+              <a:buFontTx/>
+              <a:buNone/>
+              <a:tabLst/>
+              <a:defRPr/>
+            </a:pPr>
+            <a:endParaRPr lang="en-US" altLang="ko-KR" dirty="0"/>
+          </a:p>
+          <a:p>
+            <a:pPr marL="0" marR="0" lvl="0" indent="0" algn="l" defTabSz="685800" rtl="0" eaLnBrk="1" fontAlgn="auto" latinLnBrk="1" hangingPunct="1">
+              <a:lnSpc>
+                <a:spcPct val="100000"/>
+              </a:lnSpc>
+              <a:spcBef>
+                <a:spcPts val="0"/>
+              </a:spcBef>
+              <a:spcAft>
+                <a:spcPts val="0"/>
+              </a:spcAft>
+              <a:buClrTx/>
+              <a:buSzTx/>
+              <a:buFontTx/>
+              <a:buNone/>
+              <a:tabLst/>
+              <a:defRPr/>
+            </a:pPr>
+            <a:r>
+              <a:rPr lang="en-US" altLang="ko-KR" dirty="0"/>
+              <a:t>I/O blocking </a:t>
+            </a:r>
+            <a:r>
+              <a:rPr lang="ko-KR" altLang="en-US" dirty="0"/>
+              <a:t>되는 동안 억지로 다른 일을 시키지 않아도 </a:t>
+            </a:r>
+            <a:r>
+              <a:rPr lang="en-US" altLang="ko-KR" dirty="0"/>
+              <a:t>core</a:t>
+            </a:r>
+            <a:r>
+              <a:rPr lang="ko-KR" altLang="en-US" dirty="0"/>
+              <a:t>는 효율적으로 일을 하는데</a:t>
+            </a:r>
+            <a:r>
+              <a:rPr lang="en-US" altLang="ko-KR" dirty="0"/>
+              <a:t>, </a:t>
+            </a:r>
+            <a:r>
+              <a:rPr lang="ko-KR" altLang="en-US" dirty="0"/>
+              <a:t>굳이 </a:t>
+            </a:r>
+            <a:r>
+              <a:rPr lang="en-US" altLang="ko-KR" dirty="0"/>
+              <a:t>I/O Non-blocking </a:t>
+            </a:r>
+            <a:r>
+              <a:rPr lang="ko-KR" altLang="en-US" dirty="0"/>
+              <a:t>을 고집해야 할 이유가 있을까요 </a:t>
+            </a:r>
+            <a:r>
+              <a:rPr lang="en-US" altLang="ko-KR" dirty="0"/>
+              <a:t>?</a:t>
+            </a:r>
+          </a:p>
+          <a:p>
+            <a:pPr marL="0" marR="0" lvl="0" indent="0" algn="l" defTabSz="685800" rtl="0" eaLnBrk="1" fontAlgn="auto" latinLnBrk="1" hangingPunct="1">
+              <a:lnSpc>
+                <a:spcPct val="100000"/>
+              </a:lnSpc>
+              <a:spcBef>
+                <a:spcPts val="0"/>
+              </a:spcBef>
+              <a:spcAft>
+                <a:spcPts val="0"/>
+              </a:spcAft>
+              <a:buClrTx/>
+              <a:buSzTx/>
+              <a:buFontTx/>
+              <a:buNone/>
+              <a:tabLst/>
+              <a:defRPr/>
+            </a:pPr>
+            <a:r>
+              <a:rPr lang="en-US" altLang="ko-KR" dirty="0"/>
+              <a:t>I/O non-blocking </a:t>
+            </a:r>
+            <a:r>
+              <a:rPr lang="ko-KR" altLang="en-US" dirty="0"/>
+              <a:t>이 왜 빠르다고들 </a:t>
+            </a:r>
+            <a:r>
+              <a:rPr lang="ko-KR" altLang="en-US" dirty="0" err="1"/>
+              <a:t>하는걸까요</a:t>
+            </a:r>
+            <a:r>
+              <a:rPr lang="ko-KR" altLang="en-US" dirty="0"/>
+              <a:t> </a:t>
+            </a:r>
+            <a:r>
+              <a:rPr lang="en-US" altLang="ko-KR" dirty="0"/>
+              <a:t>?</a:t>
+            </a:r>
+          </a:p>
+          <a:p>
+            <a:pPr marL="0" marR="0" lvl="0" indent="0" algn="l" defTabSz="685800" rtl="0" eaLnBrk="1" fontAlgn="auto" latinLnBrk="1" hangingPunct="1">
+              <a:lnSpc>
+                <a:spcPct val="100000"/>
+              </a:lnSpc>
+              <a:spcBef>
+                <a:spcPts val="0"/>
+              </a:spcBef>
+              <a:spcAft>
+                <a:spcPts val="0"/>
+              </a:spcAft>
+              <a:buClrTx/>
+              <a:buSzTx/>
+              <a:buFontTx/>
+              <a:buNone/>
+              <a:tabLst/>
+              <a:defRPr/>
+            </a:pPr>
+            <a:endParaRPr lang="en-US" altLang="ko-KR" dirty="0"/>
+          </a:p>
+          <a:p>
+            <a:pPr marL="0" marR="0" lvl="0" indent="0" algn="l" defTabSz="685800" rtl="0" eaLnBrk="1" fontAlgn="auto" latinLnBrk="1" hangingPunct="1">
+              <a:lnSpc>
+                <a:spcPct val="100000"/>
+              </a:lnSpc>
+              <a:spcBef>
+                <a:spcPts val="0"/>
+              </a:spcBef>
+              <a:spcAft>
+                <a:spcPts val="0"/>
+              </a:spcAft>
+              <a:buClrTx/>
+              <a:buSzTx/>
+              <a:buFontTx/>
+              <a:buNone/>
+              <a:tabLst/>
+              <a:defRPr/>
+            </a:pPr>
+            <a:endParaRPr lang="en-US" altLang="ko-KR" dirty="0"/>
+          </a:p>
+          <a:p>
+            <a:r>
+              <a:rPr lang="en-US" altLang="ko-KR" b="1" dirty="0"/>
+              <a:t>Context switching</a:t>
+            </a:r>
+          </a:p>
+          <a:p>
+            <a:endParaRPr lang="en-US" altLang="ko-KR" dirty="0"/>
+          </a:p>
+          <a:p>
+            <a:r>
+              <a:rPr lang="en-US" altLang="ko-KR" dirty="0"/>
+              <a:t>CPU</a:t>
+            </a:r>
+            <a:r>
+              <a:rPr lang="ko-KR" altLang="en-US" dirty="0"/>
+              <a:t>가 현재 작업중인 </a:t>
+            </a:r>
+            <a:r>
+              <a:rPr lang="en-US" altLang="ko-KR" dirty="0"/>
+              <a:t>thread</a:t>
+            </a:r>
+            <a:r>
+              <a:rPr lang="ko-KR" altLang="en-US" dirty="0"/>
+              <a:t>를 중지시키고 다른 </a:t>
+            </a:r>
+            <a:r>
+              <a:rPr lang="en-US" altLang="ko-KR" dirty="0"/>
+              <a:t>thread</a:t>
+            </a:r>
+            <a:r>
+              <a:rPr lang="ko-KR" altLang="en-US" dirty="0"/>
+              <a:t>를 실행시키기 위해서는</a:t>
+            </a:r>
+            <a:endParaRPr lang="en-US" altLang="ko-KR" dirty="0"/>
+          </a:p>
+          <a:p>
+            <a:r>
+              <a:rPr lang="ko-KR" altLang="en-US" dirty="0"/>
+              <a:t>지금까지의 </a:t>
+            </a:r>
+            <a:r>
+              <a:rPr lang="en-US" altLang="ko-KR" dirty="0"/>
+              <a:t>thread </a:t>
+            </a:r>
+            <a:r>
+              <a:rPr lang="ko-KR" altLang="en-US" dirty="0"/>
+              <a:t>상태를 저장하고</a:t>
+            </a:r>
+            <a:r>
+              <a:rPr lang="en-US" altLang="ko-KR" dirty="0"/>
+              <a:t>, </a:t>
+            </a:r>
+            <a:r>
+              <a:rPr lang="ko-KR" altLang="en-US" dirty="0"/>
+              <a:t>새 </a:t>
+            </a:r>
+            <a:r>
+              <a:rPr lang="en-US" altLang="ko-KR" dirty="0"/>
+              <a:t>thread </a:t>
+            </a:r>
+            <a:r>
+              <a:rPr lang="ko-KR" altLang="en-US" dirty="0"/>
+              <a:t>의 상태를 복원해야 합니다</a:t>
+            </a:r>
+            <a:r>
+              <a:rPr lang="en-US" altLang="ko-KR" dirty="0"/>
+              <a:t>.</a:t>
+            </a:r>
+          </a:p>
+          <a:p>
+            <a:r>
+              <a:rPr lang="ko-KR" altLang="en-US" dirty="0"/>
+              <a:t>이 과정을 </a:t>
+            </a:r>
+            <a:r>
+              <a:rPr lang="en-US" altLang="ko-KR" dirty="0"/>
+              <a:t>Thread context switching </a:t>
+            </a:r>
+            <a:r>
+              <a:rPr lang="ko-KR" altLang="en-US" dirty="0"/>
+              <a:t>이라 부릅니다</a:t>
+            </a:r>
+            <a:r>
+              <a:rPr lang="en-US" altLang="ko-KR" dirty="0"/>
+              <a:t>.</a:t>
+            </a:r>
+          </a:p>
+          <a:p>
+            <a:endParaRPr lang="en-US" altLang="ko-KR" dirty="0"/>
+          </a:p>
+          <a:p>
+            <a:r>
+              <a:rPr lang="ko-KR" altLang="en-US" dirty="0"/>
+              <a:t>복원해야 할 정보는</a:t>
+            </a:r>
+            <a:r>
+              <a:rPr lang="en-US" altLang="ko-KR" dirty="0"/>
+              <a:t>,</a:t>
+            </a:r>
+            <a:r>
+              <a:rPr lang="ko-KR" altLang="en-US" dirty="0"/>
+              <a:t> </a:t>
+            </a:r>
+            <a:r>
+              <a:rPr lang="en-US" altLang="ko-KR" dirty="0"/>
+              <a:t>Thread</a:t>
+            </a:r>
+            <a:r>
+              <a:rPr lang="ko-KR" altLang="en-US" dirty="0"/>
+              <a:t>간 메모리를 공유하기 때문에 </a:t>
+            </a:r>
+            <a:r>
+              <a:rPr lang="en-US" altLang="ko-KR" dirty="0"/>
+              <a:t>process context switching </a:t>
+            </a:r>
+            <a:r>
+              <a:rPr lang="ko-KR" altLang="en-US" dirty="0"/>
+              <a:t>에 비해 훨씬 작긴 하지만</a:t>
+            </a:r>
+            <a:r>
+              <a:rPr lang="en-US" altLang="ko-KR" dirty="0"/>
+              <a:t>, </a:t>
             </a:r>
             <a:r>
               <a:rPr lang="ko-KR" altLang="en-US" dirty="0"/>
@@ -1522,33 +1748,7 @@
             </a:r>
             <a:r>
               <a:rPr lang="ko-KR" altLang="en-US" dirty="0"/>
-              <a:t>프로그램 카운터</a:t>
-            </a:r>
-            <a:r>
-              <a:rPr lang="en-US" altLang="ko-KR" dirty="0"/>
-              <a:t>) </a:t>
-            </a:r>
-            <a:r>
-              <a:rPr lang="ko-KR" altLang="en-US" dirty="0"/>
-              <a:t>저장</a:t>
-            </a:r>
-            <a:r>
-              <a:rPr lang="en-US" altLang="ko-KR" dirty="0"/>
-              <a:t>/</a:t>
-            </a:r>
-            <a:r>
-              <a:rPr lang="ko-KR" altLang="en-US" dirty="0"/>
-              <a:t>복구 </a:t>
-            </a:r>
-            <a:r>
-              <a:rPr lang="en-US" altLang="ko-KR" dirty="0">
-                <a:sym typeface="Wingdings" panose="05000000000000000000" pitchFamily="2" charset="2"/>
-              </a:rPr>
-              <a:t> </a:t>
-            </a:r>
-            <a:r>
-              <a:rPr lang="ko-KR" altLang="en-US" dirty="0"/>
-              <a:t>로컬 참조가 많을 수록 비용이 더 커집니다</a:t>
+              <a:t>프로그램 카운터 등을 저장하고 복원해야 합니다</a:t>
             </a:r>
             <a:r>
               <a:rPr lang="en-US" altLang="ko-KR" dirty="0"/>
@@ -1558,7 +1758,110 @@
           <a:p>
             <a:r>
               <a:rPr lang="en-US" altLang="ko-KR" dirty="0"/>
-              <a:t>thread</a:t>
+              <a:t>Thread</a:t>
+            </a:r>
+            <a:r>
+              <a:rPr lang="ko-KR" altLang="en-US" dirty="0"/>
+              <a:t>는 </a:t>
+            </a:r>
+            <a:r>
+              <a:rPr lang="en-US" altLang="ko-KR" dirty="0"/>
+              <a:t>User mode</a:t>
+            </a:r>
+            <a:r>
+              <a:rPr lang="ko-KR" altLang="en-US" dirty="0"/>
+              <a:t>와 </a:t>
+            </a:r>
+            <a:r>
+              <a:rPr lang="en-US" altLang="ko-KR" dirty="0"/>
+              <a:t>Kernel mode</a:t>
+            </a:r>
+            <a:r>
+              <a:rPr lang="ko-KR" altLang="en-US" dirty="0" err="1"/>
+              <a:t>란게</a:t>
+            </a:r>
+            <a:r>
+              <a:rPr lang="ko-KR" altLang="en-US" dirty="0"/>
+              <a:t> 있는데</a:t>
+            </a:r>
+            <a:r>
+              <a:rPr lang="en-US" altLang="ko-KR" dirty="0"/>
+              <a:t>, Java</a:t>
+            </a:r>
+            <a:r>
+              <a:rPr lang="ko-KR" altLang="en-US" dirty="0"/>
+              <a:t>는 </a:t>
+            </a:r>
+            <a:r>
+              <a:rPr lang="en-US" altLang="ko-KR" dirty="0"/>
+              <a:t>User mode</a:t>
+            </a:r>
+            <a:r>
+              <a:rPr lang="ko-KR" altLang="en-US" dirty="0"/>
+              <a:t>과 </a:t>
+            </a:r>
+            <a:r>
+              <a:rPr lang="en-US" altLang="ko-KR" dirty="0"/>
+              <a:t>Kernel mode</a:t>
+            </a:r>
+            <a:r>
+              <a:rPr lang="ko-KR" altLang="en-US" dirty="0"/>
+              <a:t>가 </a:t>
+            </a:r>
+            <a:r>
+              <a:rPr lang="en-US" altLang="ko-KR" dirty="0"/>
+              <a:t>1:1</a:t>
+            </a:r>
+            <a:r>
+              <a:rPr lang="ko-KR" altLang="en-US" dirty="0"/>
+              <a:t>이기 때문에 이 </a:t>
+            </a:r>
+            <a:r>
+              <a:rPr lang="en-US" altLang="ko-KR" dirty="0"/>
+              <a:t>mode </a:t>
+            </a:r>
+            <a:r>
+              <a:rPr lang="ko-KR" altLang="en-US" dirty="0"/>
+              <a:t>전환에도 </a:t>
+            </a:r>
+            <a:r>
+              <a:rPr lang="en-US" altLang="ko-KR" dirty="0"/>
+              <a:t>switching </a:t>
+            </a:r>
+            <a:r>
+              <a:rPr lang="ko-KR" altLang="en-US" dirty="0"/>
+              <a:t>비용이 발생합니다</a:t>
+            </a:r>
+            <a:r>
+              <a:rPr lang="en-US" altLang="ko-KR" dirty="0"/>
+              <a:t>.</a:t>
+            </a:r>
+          </a:p>
+          <a:p>
+            <a:pPr marL="0" marR="0" lvl="0" indent="0" algn="l" defTabSz="685800" rtl="0" eaLnBrk="1" fontAlgn="auto" latinLnBrk="1" hangingPunct="1">
+              <a:lnSpc>
+                <a:spcPct val="100000"/>
+              </a:lnSpc>
+              <a:spcBef>
+                <a:spcPts val="0"/>
+              </a:spcBef>
+              <a:spcAft>
+                <a:spcPts val="0"/>
+              </a:spcAft>
+              <a:buClrTx/>
+              <a:buSzTx/>
+              <a:buFontTx/>
+              <a:buNone/>
+              <a:tabLst/>
+              <a:defRPr/>
+            </a:pPr>
+            <a:r>
+              <a:rPr lang="ko-KR" altLang="en-US" dirty="0"/>
+              <a:t>마지막으로</a:t>
+            </a:r>
+            <a:r>
+              <a:rPr lang="en-US" altLang="ko-KR" dirty="0"/>
+              <a:t>, thread</a:t>
             </a:r>
             <a:r>
               <a:rPr lang="ko-KR" altLang="en-US" dirty="0"/>
@@ -1588,7 +1891,7 @@
           <a:p>
             <a:r>
               <a:rPr lang="ko-KR" altLang="en-US" dirty="0"/>
-              <a:t>전환비용은 대략 </a:t>
+              <a:t>이런 전환비용은 대략 </a:t>
             </a:r>
             <a:r>
               <a:rPr lang="en-US" altLang="ko-KR" dirty="0"/>
@@ -1598,6 +1901,14 @@
               <a:rPr lang="en-US" altLang="ko-KR" dirty="0" err="1"/>
               <a:t>ms</a:t>
             </a:r>
+            <a:r>
+              <a:rPr lang="en-US" altLang="ko-KR" dirty="0"/>
+              <a:t> </a:t>
+            </a:r>
+            <a:r>
+              <a:rPr lang="ko-KR" altLang="en-US" dirty="0"/>
+              <a:t>정도 소요된다고 하며</a:t>
+            </a:r>
             <a:endParaRPr lang="en-US" altLang="ko-KR" dirty="0"/>
           </a:p>
           <a:p>
@@ -1610,10 +1921,64 @@
             <a:endParaRPr lang="en-US" altLang="ko-KR" dirty="0"/>
           </a:p>
           <a:p>
+            <a:r>
+              <a:rPr lang="ko-KR" altLang="en-US" dirty="0"/>
+              <a:t>이 시간동안 </a:t>
+            </a:r>
+            <a:r>
+              <a:rPr lang="en-US" altLang="ko-KR" dirty="0"/>
+              <a:t>core</a:t>
+            </a:r>
+            <a:r>
+              <a:rPr lang="ko-KR" altLang="en-US" dirty="0"/>
+              <a:t>는 아무런 작업을 하지 않습니다</a:t>
+            </a:r>
+            <a:r>
+              <a:rPr lang="en-US" altLang="ko-KR" dirty="0"/>
+              <a:t>. core </a:t>
+            </a:r>
+            <a:r>
+              <a:rPr lang="ko-KR" altLang="en-US" dirty="0"/>
+              <a:t>실행이 </a:t>
+            </a:r>
+            <a:r>
+              <a:rPr lang="en-US" altLang="ko-KR" dirty="0"/>
+              <a:t>block </a:t>
+            </a:r>
+            <a:r>
+              <a:rPr lang="ko-KR" altLang="en-US" dirty="0" err="1"/>
+              <a:t>되는거죠</a:t>
+            </a:r>
+            <a:r>
+              <a:rPr lang="en-US" altLang="ko-KR" dirty="0"/>
+              <a:t>.</a:t>
+            </a:r>
+          </a:p>
+          <a:p>
             <a:endParaRPr lang="en-US" altLang="ko-KR" dirty="0"/>
           </a:p>
           <a:p>
             <a:r>
+              <a:rPr lang="ko-KR" altLang="en-US" dirty="0"/>
+              <a:t>저희가 서버를 </a:t>
+            </a:r>
+            <a:r>
+              <a:rPr lang="ko-KR" altLang="en-US" dirty="0" err="1"/>
+              <a:t>할당받을</a:t>
+            </a:r>
+            <a:r>
+              <a:rPr lang="ko-KR" altLang="en-US" dirty="0"/>
+              <a:t> 때</a:t>
+            </a:r>
+            <a:r>
+              <a:rPr lang="en-US" altLang="ko-KR" dirty="0"/>
+              <a:t>, VM</a:t>
+            </a:r>
+            <a:r>
+              <a:rPr lang="ko-KR" altLang="en-US" dirty="0"/>
+              <a:t>의 </a:t>
+            </a:r>
+            <a:r>
               <a:rPr lang="en-US" altLang="ko-KR" dirty="0"/>
               <a:t>core</a:t>
             </a:r>
@@ -1635,14 +2000,130 @@
             </a:r>
             <a:r>
               <a:rPr lang="ko-KR" altLang="en-US" dirty="0"/>
-              <a:t>개 정도인데</a:t>
+              <a:t>개 정도일 겁니다</a:t>
+            </a:r>
+            <a:r>
+              <a:rPr lang="en-US" altLang="ko-KR" dirty="0"/>
+              <a:t>.</a:t>
+            </a:r>
+          </a:p>
+          <a:p>
+            <a:r>
+              <a:rPr lang="ko-KR" altLang="en-US" dirty="0"/>
+              <a:t>여기에 </a:t>
+            </a:r>
+            <a:r>
+              <a:rPr lang="en-US" altLang="ko-KR" dirty="0"/>
+              <a:t>thread </a:t>
+            </a:r>
+            <a:r>
+              <a:rPr lang="ko-KR" altLang="en-US" dirty="0"/>
+              <a:t>를 </a:t>
+            </a:r>
+            <a:r>
+              <a:rPr lang="en-US" altLang="ko-KR" dirty="0"/>
+              <a:t>1000</a:t>
+            </a:r>
+            <a:r>
+              <a:rPr lang="ko-KR" altLang="en-US" dirty="0"/>
+              <a:t>개 띄운다고 가정해보면</a:t>
             </a:r>
             <a:endParaRPr lang="en-US" altLang="ko-KR" dirty="0"/>
           </a:p>
           <a:p>
-            <a:r>
-              <a:rPr lang="ko-KR" altLang="en-US" dirty="0"/>
-              <a:t>여기에 </a:t>
+            <a:endParaRPr lang="en-US" altLang="ko-KR" dirty="0"/>
+          </a:p>
+          <a:p>
+            <a:r>
+              <a:rPr lang="ko-KR" altLang="en-US" dirty="0"/>
+              <a:t>부하가 적어 </a:t>
+            </a:r>
+            <a:r>
+              <a:rPr lang="en-US" altLang="ko-KR" dirty="0"/>
+              <a:t>working thread </a:t>
+            </a:r>
+            <a:r>
+              <a:rPr lang="ko-KR" altLang="en-US" dirty="0"/>
+              <a:t>가 얼마 안 될 때는 아무런 문제가 되지 않습니다</a:t>
+            </a:r>
+            <a:r>
+              <a:rPr lang="en-US" altLang="ko-KR" dirty="0"/>
+              <a:t>.</a:t>
+            </a:r>
+          </a:p>
+          <a:p>
+            <a:r>
+              <a:rPr lang="en-US" altLang="ko-KR" dirty="0"/>
+              <a:t>CPU </a:t>
+            </a:r>
+            <a:r>
+              <a:rPr lang="ko-KR" altLang="en-US" dirty="0"/>
+              <a:t>경합이 발생하지 않아</a:t>
+            </a:r>
+            <a:r>
+              <a:rPr lang="en-US" altLang="ko-KR" dirty="0"/>
+              <a:t>, thread </a:t>
+            </a:r>
+            <a:r>
+              <a:rPr lang="ko-KR" altLang="en-US" dirty="0"/>
+              <a:t>는 처음 </a:t>
+            </a:r>
+            <a:r>
+              <a:rPr lang="ko-KR" altLang="en-US" dirty="0" err="1"/>
+              <a:t>할당받은</a:t>
+            </a:r>
+            <a:r>
+              <a:rPr lang="ko-KR" altLang="en-US" dirty="0"/>
+              <a:t> </a:t>
+            </a:r>
+            <a:r>
+              <a:rPr lang="en-US" altLang="ko-KR" dirty="0"/>
+              <a:t>core</a:t>
+            </a:r>
+            <a:r>
+              <a:rPr lang="ko-KR" altLang="en-US" dirty="0"/>
+              <a:t>에서 계속 실행될 </a:t>
+            </a:r>
+            <a:r>
+              <a:rPr lang="ko-KR" altLang="en-US" dirty="0" err="1"/>
+              <a:t>꺼고</a:t>
+            </a:r>
+            <a:r>
+              <a:rPr lang="en-US" altLang="ko-KR" dirty="0"/>
+              <a:t>, context switching </a:t>
+            </a:r>
+            <a:r>
+              <a:rPr lang="ko-KR" altLang="en-US" dirty="0"/>
+              <a:t>은 큰 비용손실 없이 자연스럽게 처리될 겁니다</a:t>
+            </a:r>
+            <a:r>
+              <a:rPr lang="en-US" altLang="ko-KR" dirty="0"/>
+              <a:t>.</a:t>
+            </a:r>
+          </a:p>
+          <a:p>
+            <a:endParaRPr lang="en-US" altLang="ko-KR" dirty="0"/>
+          </a:p>
+          <a:p>
+            <a:r>
+              <a:rPr lang="ko-KR" altLang="en-US" dirty="0"/>
+              <a:t>그런데</a:t>
+            </a:r>
+            <a:r>
+              <a:rPr lang="en-US" altLang="ko-KR" dirty="0"/>
+              <a:t>, </a:t>
+            </a:r>
+            <a:r>
+              <a:rPr lang="ko-KR" altLang="en-US" dirty="0"/>
+              <a:t>부하가 많아져서 </a:t>
+            </a:r>
+            <a:r>
+              <a:rPr lang="en-US" altLang="ko-KR" dirty="0"/>
+              <a:t>1000</a:t>
+            </a:r>
+            <a:r>
+              <a:rPr lang="ko-KR" altLang="en-US" dirty="0"/>
+              <a:t>개 </a:t>
             </a:r>
             <a:r>
               <a:rPr lang="en-US" altLang="ko-KR" dirty="0"/>
@@ -1650,123 +2131,78 @@
             </a:r>
             <a:r>
               <a:rPr lang="ko-KR" altLang="en-US" dirty="0"/>
-              <a:t>를 </a:t>
-            </a:r>
-            <a:r>
-              <a:rPr lang="en-US" altLang="ko-KR" dirty="0"/>
-              <a:t>1000</a:t>
-            </a:r>
-            <a:r>
-              <a:rPr lang="ko-KR" altLang="en-US" dirty="0"/>
-              <a:t>개 띄운다고 가정해보면</a:t>
+              <a:t>가 모두 일하는 상황이 된다면</a:t>
+            </a:r>
+            <a:r>
+              <a:rPr lang="en-US" altLang="ko-KR" dirty="0"/>
+              <a:t>,</a:t>
+            </a:r>
+          </a:p>
+          <a:p>
+            <a:r>
+              <a:rPr lang="ko-KR" altLang="en-US" dirty="0"/>
+              <a:t>적은 </a:t>
+            </a:r>
+            <a:r>
+              <a:rPr lang="en-US" altLang="ko-KR" dirty="0"/>
+              <a:t>core</a:t>
+            </a:r>
+            <a:r>
+              <a:rPr lang="ko-KR" altLang="en-US" dirty="0"/>
+              <a:t>를 차지하기 위해 </a:t>
+            </a:r>
+            <a:r>
+              <a:rPr lang="en-US" altLang="ko-KR" dirty="0"/>
+              <a:t>thread </a:t>
+            </a:r>
+            <a:r>
+              <a:rPr lang="ko-KR" altLang="en-US" dirty="0"/>
+              <a:t>간 경합이 발생하며</a:t>
             </a:r>
             <a:endParaRPr lang="en-US" altLang="ko-KR" dirty="0"/>
           </a:p>
           <a:p>
+            <a:r>
+              <a:rPr lang="en-US" altLang="ko-KR" dirty="0"/>
+              <a:t>core</a:t>
+            </a:r>
+            <a:r>
+              <a:rPr lang="ko-KR" altLang="en-US" dirty="0"/>
+              <a:t>에서 분할 실행되는 </a:t>
+            </a:r>
+            <a:r>
+              <a:rPr lang="en-US" altLang="ko-KR" dirty="0"/>
+              <a:t>thread </a:t>
+            </a:r>
+            <a:r>
+              <a:rPr lang="ko-KR" altLang="en-US" dirty="0"/>
+              <a:t>개수가 많아지고</a:t>
+            </a:r>
+            <a:r>
+              <a:rPr lang="en-US" altLang="ko-KR" dirty="0"/>
+              <a:t>, </a:t>
+            </a:r>
+            <a:r>
+              <a:rPr lang="ko-KR" altLang="en-US" dirty="0"/>
+              <a:t>이는 그만큼 </a:t>
+            </a:r>
+            <a:r>
+              <a:rPr lang="en-US" altLang="ko-KR" dirty="0"/>
+              <a:t>context switching </a:t>
+            </a:r>
+            <a:r>
+              <a:rPr lang="ko-KR" altLang="en-US" dirty="0"/>
+              <a:t>회수가 많아지게 되므로</a:t>
+            </a:r>
             <a:endParaRPr lang="en-US" altLang="ko-KR" dirty="0"/>
           </a:p>
           <a:p>
-            <a:r>
-              <a:rPr lang="ko-KR" altLang="en-US" dirty="0"/>
-              <a:t>부하가 적어 일하는 </a:t>
-            </a:r>
-            <a:r>
-              <a:rPr lang="en-US" altLang="ko-KR" dirty="0"/>
-              <a:t>thread </a:t>
-            </a:r>
-            <a:r>
-              <a:rPr lang="ko-KR" altLang="en-US" dirty="0"/>
-              <a:t>가 얼마 안 될 때는 아무런 문제가 되지 않습니다</a:t>
-            </a:r>
-            <a:r>
-              <a:rPr lang="en-US" altLang="ko-KR" dirty="0"/>
-              <a:t>. thread context switching </a:t>
-            </a:r>
-            <a:r>
-              <a:rPr lang="ko-KR" altLang="en-US" dirty="0"/>
-              <a:t>은 자연스럽게 처리되는데요</a:t>
-            </a:r>
-            <a:r>
-              <a:rPr lang="en-US" altLang="ko-KR" dirty="0"/>
-              <a:t>.</a:t>
-            </a:r>
-          </a:p>
-          <a:p>
             <a:endParaRPr lang="en-US" altLang="ko-KR" dirty="0"/>
           </a:p>
           <a:p>
             <a:r>
               <a:rPr lang="ko-KR" altLang="en-US" dirty="0"/>
-              <a:t>부하가 많아져서 </a:t>
-            </a:r>
-            <a:r>
-              <a:rPr lang="en-US" altLang="ko-KR" dirty="0"/>
-              <a:t>1000</a:t>
-            </a:r>
-            <a:r>
-              <a:rPr lang="ko-KR" altLang="en-US" dirty="0"/>
-              <a:t>개 </a:t>
-            </a:r>
-            <a:r>
-              <a:rPr lang="en-US" altLang="ko-KR" dirty="0"/>
-              <a:t>thread </a:t>
-            </a:r>
-            <a:r>
-              <a:rPr lang="ko-KR" altLang="en-US" dirty="0"/>
-              <a:t>가 모두 일하는 상황이 된다면</a:t>
-            </a:r>
-            <a:r>
-              <a:rPr lang="en-US" altLang="ko-KR" dirty="0"/>
-              <a:t>,</a:t>
-            </a:r>
-          </a:p>
-          <a:p>
-            <a:r>
-              <a:rPr lang="ko-KR" altLang="en-US" dirty="0"/>
-              <a:t>적은 </a:t>
-            </a:r>
-            <a:r>
-              <a:rPr lang="en-US" altLang="ko-KR" dirty="0"/>
-              <a:t>core</a:t>
-            </a:r>
-            <a:r>
-              <a:rPr lang="ko-KR" altLang="en-US" dirty="0"/>
-              <a:t>를 차지하기 위해 </a:t>
-            </a:r>
-            <a:r>
-              <a:rPr lang="en-US" altLang="ko-KR" dirty="0"/>
-              <a:t>thread </a:t>
-            </a:r>
-            <a:r>
-              <a:rPr lang="ko-KR" altLang="en-US" dirty="0"/>
-              <a:t>간 경합이 발생하며</a:t>
-            </a:r>
-            <a:endParaRPr lang="en-US" altLang="ko-KR" dirty="0"/>
-          </a:p>
-          <a:p>
-            <a:r>
-              <a:rPr lang="en-US" altLang="ko-KR" dirty="0"/>
-              <a:t>core</a:t>
-            </a:r>
-            <a:r>
-              <a:rPr lang="ko-KR" altLang="en-US" dirty="0"/>
-              <a:t>에서 분할 실행되는 </a:t>
-            </a:r>
-            <a:r>
-              <a:rPr lang="en-US" altLang="ko-KR" dirty="0"/>
-              <a:t>thread </a:t>
-            </a:r>
-            <a:r>
-              <a:rPr lang="ko-KR" altLang="en-US" dirty="0"/>
-              <a:t>개수가 많아지고</a:t>
-            </a:r>
-            <a:r>
-              <a:rPr lang="en-US" altLang="ko-KR" dirty="0"/>
-              <a:t>, </a:t>
-            </a:r>
-            <a:r>
-              <a:rPr lang="ko-KR" altLang="en-US" dirty="0"/>
-              <a:t>이는 그만큼 </a:t>
+              <a:t>결과적으로 </a:t>
             </a:r>
             <a:r>
               <a:rPr lang="en-US" altLang="ko-KR" dirty="0"/>
@@ -1774,25 +2210,7 @@
             </a:r>
             <a:r>
               <a:rPr lang="ko-KR" altLang="en-US" dirty="0"/>
-              <a:t>회수가 많아진다는 것과 같으므로</a:t>
-            </a:r>
-            <a:endParaRPr lang="en-US" altLang="ko-KR" dirty="0"/>
-          </a:p>
-          <a:p>
-            <a:endParaRPr lang="en-US" altLang="ko-KR" dirty="0"/>
-          </a:p>
-          <a:p>
-            <a:r>
-              <a:rPr lang="ko-KR" altLang="en-US" dirty="0"/>
-              <a:t>결과적으로 </a:t>
-            </a:r>
-            <a:r>
-              <a:rPr lang="en-US" altLang="ko-KR" dirty="0"/>
-              <a:t>context switching </a:t>
-            </a:r>
-            <a:r>
-              <a:rPr lang="ko-KR" altLang="en-US" dirty="0"/>
-              <a:t>비용 총합이 무시 못할 수준으로 많아지는 결과를 초래합니다</a:t>
+              <a:t>비용 총합이 커지는 결과를 초래합니다</a:t>
             </a:r>
             <a:r>
               <a:rPr lang="en-US" altLang="ko-KR" dirty="0"/>

</xml_diff>